<commit_message>
Added blurb and thumbnail to langchain CS
</commit_message>
<xml_diff>
--- a/Images/huggingface_thumbnail.pptx
+++ b/Images/huggingface_thumbnail.pptx
@@ -3783,7 +3783,9 @@
             <a:avLst/>
           </a:prstGeom>
           <a:solidFill>
-            <a:srgbClr val="FFFFFF"/>
+            <a:srgbClr val="FFFFFF">
+              <a:alpha val="0"/>
+            </a:srgbClr>
           </a:solidFill>
           <a:ln>
             <a:noFill/>
@@ -3836,15 +3838,15 @@
               </a:ext>
             </a:extLst>
           </a:blip>
-          <a:srcRect t="2264"/>
+          <a:srcRect t="2264" b="3454"/>
           <a:stretch>
             <a:fillRect/>
           </a:stretch>
         </p:blipFill>
         <p:spPr>
           <a:xfrm>
-            <a:off x="2598604" y="0"/>
-            <a:ext cx="7016826" cy="6858000"/>
+            <a:off x="2598604" y="242374"/>
+            <a:ext cx="7016826" cy="6615626"/>
           </a:xfrm>
           <a:prstGeom prst="rect">
             <a:avLst/>

</xml_diff>